<commit_message>
updated Project Presentation with latest changes
</commit_message>
<xml_diff>
--- a/Project Presentation.pptx
+++ b/Project Presentation.pptx
@@ -218,7 +218,7 @@
           <a:p>
             <a:fld id="{46256A78-79A6-408F-8148-4F87BB81602D}" type="datetimeFigureOut">
               <a:rPr lang="en-IN" smtClean="0"/>
-              <a:t>13-02-2025</a:t>
+              <a:t>19-02-2025</a:t>
             </a:fld>
             <a:endParaRPr lang="en-IN"/>
           </a:p>
@@ -722,7 +722,7 @@
           <a:p>
             <a:fld id="{ED291B17-9318-49DB-B28B-6E5994AE9581}" type="datetime1">
               <a:rPr lang="en-US" smtClean="0"/>
-              <a:t>13-Feb-25</a:t>
+              <a:t>19-Feb-25</a:t>
             </a:fld>
             <a:endParaRPr lang="en-US"/>
           </a:p>
@@ -931,7 +931,7 @@
           <a:p>
             <a:fld id="{2CED4963-E985-44C4-B8C4-FDD613B7C2F8}" type="datetime1">
               <a:rPr lang="en-US" smtClean="0"/>
-              <a:t>13-Feb-25</a:t>
+              <a:t>19-Feb-25</a:t>
             </a:fld>
             <a:endParaRPr lang="en-US"/>
           </a:p>
@@ -1299,7 +1299,7 @@
           <a:p>
             <a:fld id="{ED291B17-9318-49DB-B28B-6E5994AE9581}" type="datetime1">
               <a:rPr lang="en-US" smtClean="0"/>
-              <a:t>13-Feb-25</a:t>
+              <a:t>19-Feb-25</a:t>
             </a:fld>
             <a:endParaRPr lang="en-US"/>
           </a:p>
@@ -1503,7 +1503,7 @@
           <a:p>
             <a:fld id="{78DD82B9-B8EE-4375-B6FF-88FA6ABB15D9}" type="datetime1">
               <a:rPr lang="en-US" smtClean="0"/>
-              <a:t>13-Feb-25</a:t>
+              <a:t>19-Feb-25</a:t>
             </a:fld>
             <a:endParaRPr lang="en-US"/>
           </a:p>
@@ -1760,7 +1760,7 @@
           <a:p>
             <a:fld id="{B2497495-0637-405E-AE64-5CC7506D51F5}" type="datetime1">
               <a:rPr lang="en-US" smtClean="0"/>
-              <a:t>13-Feb-25</a:t>
+              <a:t>19-Feb-25</a:t>
             </a:fld>
             <a:endParaRPr lang="en-US"/>
           </a:p>
@@ -2018,7 +2018,7 @@
           <a:p>
             <a:fld id="{7BFFD690-9426-415D-8B65-26881E07B2D4}" type="datetime1">
               <a:rPr lang="en-US" smtClean="0"/>
-              <a:t>13-Feb-25</a:t>
+              <a:t>19-Feb-25</a:t>
             </a:fld>
             <a:endParaRPr lang="en-US"/>
           </a:p>
@@ -2445,7 +2445,7 @@
           <a:p>
             <a:fld id="{04C4989A-474C-40DE-95B9-011C28B71673}" type="datetime1">
               <a:rPr lang="en-US" smtClean="0"/>
-              <a:t>13-Feb-25</a:t>
+              <a:t>19-Feb-25</a:t>
             </a:fld>
             <a:endParaRPr lang="en-US"/>
           </a:p>
@@ -2575,7 +2575,7 @@
           <a:p>
             <a:fld id="{5DB4ED54-5B5E-4A04-93D3-5772E3CE3818}" type="datetime1">
               <a:rPr lang="en-US" smtClean="0"/>
-              <a:t>13-Feb-25</a:t>
+              <a:t>19-Feb-25</a:t>
             </a:fld>
             <a:endParaRPr lang="en-US"/>
           </a:p>
@@ -2678,7 +2678,7 @@
           <a:p>
             <a:fld id="{4EDE50D6-574B-40AF-946F-D52A04ADE379}" type="datetime1">
               <a:rPr lang="en-US" smtClean="0"/>
-              <a:t>13-Feb-25</a:t>
+              <a:t>19-Feb-25</a:t>
             </a:fld>
             <a:endParaRPr lang="en-US"/>
           </a:p>
@@ -3061,7 +3061,7 @@
           <a:p>
             <a:fld id="{D82884F1-FFEA-405F-9602-3DCA865EDA4E}" type="datetime1">
               <a:rPr lang="en-US" smtClean="0"/>
-              <a:t>13-Feb-25</a:t>
+              <a:t>19-Feb-25</a:t>
             </a:fld>
             <a:endParaRPr lang="en-US"/>
           </a:p>
@@ -3355,7 +3355,7 @@
           <a:p>
             <a:fld id="{7E18DB4A-8810-4A10-AD5C-D5E2C667F5B3}" type="datetime1">
               <a:rPr lang="en-US" smtClean="0"/>
-              <a:t>13-Feb-25</a:t>
+              <a:t>19-Feb-25</a:t>
             </a:fld>
             <a:endParaRPr lang="en-US"/>
           </a:p>
@@ -3576,7 +3576,7 @@
           <a:p>
             <a:fld id="{ED291B17-9318-49DB-B28B-6E5994AE9581}" type="datetime1">
               <a:rPr lang="en-US" smtClean="0"/>
-              <a:t>13-Feb-25</a:t>
+              <a:t>19-Feb-25</a:t>
             </a:fld>
             <a:endParaRPr lang="en-US"/>
           </a:p>
@@ -5249,8 +5249,8 @@
         </p:nvSpPr>
         <p:spPr bwMode="auto">
           <a:xfrm>
-            <a:off x="581192" y="1795507"/>
-            <a:ext cx="6192401" cy="3266985"/>
+            <a:off x="581192" y="1755080"/>
+            <a:ext cx="5950347" cy="3347840"/>
           </a:xfrm>
           <a:prstGeom prst="rect">
             <a:avLst/>
@@ -5314,7 +5314,7 @@
               <a:buChar char="•"/>
             </a:pPr>
             <a:r>
-              <a:rPr kumimoji="0" lang="en-US" altLang="en-US" sz="2000" b="1" i="0" u="none" strike="noStrike" cap="none" normalizeH="0" baseline="0" dirty="0">
+              <a:rPr kumimoji="0" lang="en-US" altLang="en-US" sz="2400" b="1" i="0" u="none" strike="noStrike" cap="none" normalizeH="0" baseline="0" dirty="0">
                 <a:ln>
                   <a:noFill/>
                 </a:ln>
@@ -5328,7 +5328,7 @@
               <a:t>Programming Language</a:t>
             </a:r>
             <a:r>
-              <a:rPr kumimoji="0" lang="en-US" altLang="en-US" sz="2000" b="0" i="0" u="none" strike="noStrike" cap="none" normalizeH="0" baseline="0" dirty="0">
+              <a:rPr kumimoji="0" lang="en-US" altLang="en-US" sz="2400" b="0" i="0" u="none" strike="noStrike" cap="none" normalizeH="0" baseline="0" dirty="0">
                 <a:ln>
                   <a:noFill/>
                 </a:ln>
@@ -5359,7 +5359,7 @@
               <a:buChar char="•"/>
             </a:pPr>
             <a:r>
-              <a:rPr kumimoji="0" lang="en-US" altLang="en-US" sz="2000" b="1" i="0" u="none" strike="noStrike" cap="none" normalizeH="0" baseline="0" dirty="0">
+              <a:rPr kumimoji="0" lang="en-US" altLang="en-US" sz="2400" b="1" i="0" u="none" strike="noStrike" cap="none" normalizeH="0" baseline="0" dirty="0">
                 <a:ln>
                   <a:noFill/>
                 </a:ln>
@@ -5373,7 +5373,7 @@
               <a:t>Libraries Used</a:t>
             </a:r>
             <a:r>
-              <a:rPr kumimoji="0" lang="en-US" altLang="en-US" sz="2000" b="0" i="0" u="none" strike="noStrike" cap="none" normalizeH="0" baseline="0" dirty="0">
+              <a:rPr kumimoji="0" lang="en-US" altLang="en-US" sz="2400" b="0" i="0" u="none" strike="noStrike" cap="none" normalizeH="0" baseline="0" dirty="0">
                 <a:ln>
                   <a:noFill/>
                 </a:ln>
@@ -5385,6 +5385,200 @@
                 <a:cs typeface="Arial" panose="020B0604020202020204" pitchFamily="34" charset="0"/>
               </a:rPr>
               <a:t>:</a:t>
+            </a:r>
+          </a:p>
+          <a:p>
+            <a:pPr lvl="1" defTabSz="914400" eaLnBrk="0" fontAlgn="base" hangingPunct="0">
+              <a:lnSpc>
+                <a:spcPct val="150000"/>
+              </a:lnSpc>
+              <a:spcBef>
+                <a:spcPct val="0"/>
+              </a:spcBef>
+              <a:spcAft>
+                <a:spcPct val="0"/>
+              </a:spcAft>
+              <a:buClrTx/>
+              <a:buSzTx/>
+              <a:buFont typeface="Arial" panose="020B0604020202020204" pitchFamily="34" charset="0"/>
+              <a:buChar char="•"/>
+            </a:pPr>
+            <a:r>
+              <a:rPr kumimoji="0" lang="en-US" altLang="en-US" sz="1800" b="1" i="0" u="none" strike="noStrike" cap="none" normalizeH="0" baseline="0" dirty="0">
+                <a:ln>
+                  <a:noFill/>
+                </a:ln>
+                <a:solidFill>
+                  <a:schemeClr val="tx1"/>
+                </a:solidFill>
+                <a:effectLst/>
+                <a:latin typeface="Arial" panose="020B0604020202020204" pitchFamily="34" charset="0"/>
+                <a:cs typeface="Arial" panose="020B0604020202020204" pitchFamily="34" charset="0"/>
+              </a:rPr>
+              <a:t>OpenCV</a:t>
+            </a:r>
+            <a:r>
+              <a:rPr kumimoji="0" lang="en-US" altLang="en-US" sz="1800" b="0" i="0" u="none" strike="noStrike" cap="none" normalizeH="0" baseline="0" dirty="0">
+                <a:ln>
+                  <a:noFill/>
+                </a:ln>
+                <a:solidFill>
+                  <a:schemeClr val="tx1"/>
+                </a:solidFill>
+                <a:effectLst/>
+                <a:latin typeface="Arial" panose="020B0604020202020204" pitchFamily="34" charset="0"/>
+                <a:cs typeface="Arial" panose="020B0604020202020204" pitchFamily="34" charset="0"/>
+              </a:rPr>
+              <a:t> (Image Processing)</a:t>
+            </a:r>
+          </a:p>
+          <a:p>
+            <a:pPr lvl="1" defTabSz="914400" eaLnBrk="0" fontAlgn="base" hangingPunct="0">
+              <a:lnSpc>
+                <a:spcPct val="150000"/>
+              </a:lnSpc>
+              <a:spcBef>
+                <a:spcPct val="0"/>
+              </a:spcBef>
+              <a:spcAft>
+                <a:spcPct val="0"/>
+              </a:spcAft>
+              <a:buClrTx/>
+              <a:buSzTx/>
+              <a:buFont typeface="Arial" panose="020B0604020202020204" pitchFamily="34" charset="0"/>
+              <a:buChar char="•"/>
+            </a:pPr>
+            <a:r>
+              <a:rPr kumimoji="0" lang="en-US" altLang="en-US" sz="1800" b="1" i="0" u="none" strike="noStrike" cap="none" normalizeH="0" baseline="0" dirty="0">
+                <a:ln>
+                  <a:noFill/>
+                </a:ln>
+                <a:solidFill>
+                  <a:schemeClr val="tx1"/>
+                </a:solidFill>
+                <a:effectLst/>
+                <a:latin typeface="Arial" panose="020B0604020202020204" pitchFamily="34" charset="0"/>
+                <a:cs typeface="Arial" panose="020B0604020202020204" pitchFamily="34" charset="0"/>
+              </a:rPr>
+              <a:t>Cryptography (Fernet)</a:t>
+            </a:r>
+            <a:r>
+              <a:rPr kumimoji="0" lang="en-US" altLang="en-US" sz="1800" b="0" i="0" u="none" strike="noStrike" cap="none" normalizeH="0" baseline="0" dirty="0">
+                <a:ln>
+                  <a:noFill/>
+                </a:ln>
+                <a:solidFill>
+                  <a:schemeClr val="tx1"/>
+                </a:solidFill>
+                <a:effectLst/>
+                <a:latin typeface="Arial" panose="020B0604020202020204" pitchFamily="34" charset="0"/>
+                <a:cs typeface="Arial" panose="020B0604020202020204" pitchFamily="34" charset="0"/>
+              </a:rPr>
+              <a:t> (Encryption &amp; Decryption)</a:t>
+            </a:r>
+          </a:p>
+          <a:p>
+            <a:pPr lvl="1" defTabSz="914400" eaLnBrk="0" fontAlgn="base" hangingPunct="0">
+              <a:lnSpc>
+                <a:spcPct val="150000"/>
+              </a:lnSpc>
+              <a:spcBef>
+                <a:spcPct val="0"/>
+              </a:spcBef>
+              <a:spcAft>
+                <a:spcPct val="0"/>
+              </a:spcAft>
+              <a:buClrTx/>
+              <a:buSzTx/>
+              <a:buFont typeface="Arial" panose="020B0604020202020204" pitchFamily="34" charset="0"/>
+              <a:buChar char="•"/>
+            </a:pPr>
+            <a:r>
+              <a:rPr kumimoji="0" lang="en-US" altLang="en-US" sz="1800" b="1" i="0" u="none" strike="noStrike" cap="none" normalizeH="0" baseline="0" dirty="0">
+                <a:ln>
+                  <a:noFill/>
+                </a:ln>
+                <a:solidFill>
+                  <a:schemeClr val="tx1"/>
+                </a:solidFill>
+                <a:effectLst/>
+                <a:latin typeface="Arial" panose="020B0604020202020204" pitchFamily="34" charset="0"/>
+                <a:cs typeface="Arial" panose="020B0604020202020204" pitchFamily="34" charset="0"/>
+              </a:rPr>
+              <a:t>PyQt5</a:t>
+            </a:r>
+            <a:r>
+              <a:rPr kumimoji="0" lang="en-US" altLang="en-US" sz="1800" b="0" i="0" u="none" strike="noStrike" cap="none" normalizeH="0" baseline="0" dirty="0">
+                <a:ln>
+                  <a:noFill/>
+                </a:ln>
+                <a:solidFill>
+                  <a:schemeClr val="tx1"/>
+                </a:solidFill>
+                <a:effectLst/>
+                <a:latin typeface="Arial" panose="020B0604020202020204" pitchFamily="34" charset="0"/>
+                <a:cs typeface="Arial" panose="020B0604020202020204" pitchFamily="34" charset="0"/>
+              </a:rPr>
+              <a:t> (Graphical User Interface)</a:t>
+            </a:r>
+          </a:p>
+          <a:p>
+            <a:pPr lvl="1" defTabSz="914400" eaLnBrk="0" fontAlgn="base" hangingPunct="0">
+              <a:lnSpc>
+                <a:spcPct val="150000"/>
+              </a:lnSpc>
+              <a:spcBef>
+                <a:spcPct val="0"/>
+              </a:spcBef>
+              <a:spcAft>
+                <a:spcPct val="0"/>
+              </a:spcAft>
+              <a:buClrTx/>
+              <a:buSzTx/>
+              <a:buFont typeface="Arial" panose="020B0604020202020204" pitchFamily="34" charset="0"/>
+              <a:buChar char="•"/>
+            </a:pPr>
+            <a:r>
+              <a:rPr kumimoji="0" lang="en-US" altLang="en-US" sz="1800" b="1" i="0" u="none" strike="noStrike" cap="none" normalizeH="0" baseline="0" dirty="0">
+                <a:ln>
+                  <a:noFill/>
+                </a:ln>
+                <a:solidFill>
+                  <a:schemeClr val="tx1"/>
+                </a:solidFill>
+                <a:effectLst/>
+                <a:latin typeface="Arial" panose="020B0604020202020204" pitchFamily="34" charset="0"/>
+                <a:cs typeface="Arial" panose="020B0604020202020204" pitchFamily="34" charset="0"/>
+              </a:rPr>
+              <a:t>Base64 &amp; </a:t>
+            </a:r>
+            <a:r>
+              <a:rPr kumimoji="0" lang="en-US" altLang="en-US" sz="1800" b="1" i="0" u="none" strike="noStrike" cap="none" normalizeH="0" baseline="0" dirty="0" err="1">
+                <a:ln>
+                  <a:noFill/>
+                </a:ln>
+                <a:solidFill>
+                  <a:schemeClr val="tx1"/>
+                </a:solidFill>
+                <a:effectLst/>
+                <a:latin typeface="Arial" panose="020B0604020202020204" pitchFamily="34" charset="0"/>
+                <a:cs typeface="Arial" panose="020B0604020202020204" pitchFamily="34" charset="0"/>
+              </a:rPr>
+              <a:t>Hashlib</a:t>
+            </a:r>
+            <a:r>
+              <a:rPr kumimoji="0" lang="en-US" altLang="en-US" sz="1800" b="0" i="0" u="none" strike="noStrike" cap="none" normalizeH="0" baseline="0" dirty="0">
+                <a:ln>
+                  <a:noFill/>
+                </a:ln>
+                <a:solidFill>
+                  <a:schemeClr val="tx1"/>
+                </a:solidFill>
+                <a:effectLst/>
+                <a:latin typeface="Arial" panose="020B0604020202020204" pitchFamily="34" charset="0"/>
+                <a:cs typeface="Arial" panose="020B0604020202020204" pitchFamily="34" charset="0"/>
+              </a:rPr>
+              <a:t> (Key Generation &amp; Encoding)</a:t>
             </a:r>
           </a:p>
           <a:p>
@@ -5404,7 +5598,7 @@
               <a:buChar char="•"/>
             </a:pPr>
             <a:r>
-              <a:rPr kumimoji="0" lang="en-US" altLang="en-US" sz="2000" b="1" i="0" u="none" strike="noStrike" cap="none" normalizeH="0" baseline="0" dirty="0">
+              <a:rPr kumimoji="0" lang="en-US" altLang="en-US" sz="2400" b="1" i="0" u="none" strike="noStrike" cap="none" normalizeH="0" baseline="0" dirty="0">
                 <a:ln>
                   <a:noFill/>
                 </a:ln>
@@ -5415,204 +5609,10 @@
                 <a:latin typeface="Arial" panose="020B0604020202020204" pitchFamily="34" charset="0"/>
                 <a:cs typeface="Arial" panose="020B0604020202020204" pitchFamily="34" charset="0"/>
               </a:rPr>
-              <a:t>OpenCV</a:t>
-            </a:r>
-            <a:r>
-              <a:rPr kumimoji="0" lang="en-US" altLang="en-US" sz="2000" b="0" i="0" u="none" strike="noStrike" cap="none" normalizeH="0" baseline="0" dirty="0">
-                <a:ln>
-                  <a:noFill/>
-                </a:ln>
-                <a:solidFill>
-                  <a:schemeClr val="tx1"/>
-                </a:solidFill>
-                <a:effectLst/>
-                <a:latin typeface="Arial" panose="020B0604020202020204" pitchFamily="34" charset="0"/>
-                <a:cs typeface="Arial" panose="020B0604020202020204" pitchFamily="34" charset="0"/>
-              </a:rPr>
-              <a:t> (Image Processing)</a:t>
-            </a:r>
-          </a:p>
-          <a:p>
-            <a:pPr defTabSz="914400" eaLnBrk="0" fontAlgn="base" hangingPunct="0">
-              <a:lnSpc>
-                <a:spcPct val="150000"/>
-              </a:lnSpc>
-              <a:spcBef>
-                <a:spcPct val="0"/>
-              </a:spcBef>
-              <a:spcAft>
-                <a:spcPct val="0"/>
-              </a:spcAft>
-              <a:buClrTx/>
-              <a:buSzTx/>
-              <a:buFont typeface="Arial" panose="020B0604020202020204" pitchFamily="34" charset="0"/>
-              <a:buChar char="•"/>
-            </a:pPr>
-            <a:r>
-              <a:rPr kumimoji="0" lang="en-US" altLang="en-US" sz="2000" b="1" i="0" u="none" strike="noStrike" cap="none" normalizeH="0" baseline="0" dirty="0">
-                <a:ln>
-                  <a:noFill/>
-                </a:ln>
-                <a:solidFill>
-                  <a:schemeClr val="tx1"/>
-                </a:solidFill>
-                <a:effectLst/>
-                <a:latin typeface="Arial" panose="020B0604020202020204" pitchFamily="34" charset="0"/>
-                <a:cs typeface="Arial" panose="020B0604020202020204" pitchFamily="34" charset="0"/>
-              </a:rPr>
-              <a:t>Cryptography (Fernet)</a:t>
-            </a:r>
-            <a:r>
-              <a:rPr kumimoji="0" lang="en-US" altLang="en-US" sz="2000" b="0" i="0" u="none" strike="noStrike" cap="none" normalizeH="0" baseline="0" dirty="0">
-                <a:ln>
-                  <a:noFill/>
-                </a:ln>
-                <a:solidFill>
-                  <a:schemeClr val="tx1"/>
-                </a:solidFill>
-                <a:effectLst/>
-                <a:latin typeface="Arial" panose="020B0604020202020204" pitchFamily="34" charset="0"/>
-                <a:cs typeface="Arial" panose="020B0604020202020204" pitchFamily="34" charset="0"/>
-              </a:rPr>
-              <a:t> (Encryption &amp; Decryption)</a:t>
-            </a:r>
-          </a:p>
-          <a:p>
-            <a:pPr defTabSz="914400" eaLnBrk="0" fontAlgn="base" hangingPunct="0">
-              <a:lnSpc>
-                <a:spcPct val="150000"/>
-              </a:lnSpc>
-              <a:spcBef>
-                <a:spcPct val="0"/>
-              </a:spcBef>
-              <a:spcAft>
-                <a:spcPct val="0"/>
-              </a:spcAft>
-              <a:buClrTx/>
-              <a:buSzTx/>
-              <a:buFont typeface="Arial" panose="020B0604020202020204" pitchFamily="34" charset="0"/>
-              <a:buChar char="•"/>
-            </a:pPr>
-            <a:r>
-              <a:rPr kumimoji="0" lang="en-US" altLang="en-US" sz="2000" b="1" i="0" u="none" strike="noStrike" cap="none" normalizeH="0" baseline="0" dirty="0">
-                <a:ln>
-                  <a:noFill/>
-                </a:ln>
-                <a:solidFill>
-                  <a:schemeClr val="tx1"/>
-                </a:solidFill>
-                <a:effectLst/>
-                <a:latin typeface="Arial" panose="020B0604020202020204" pitchFamily="34" charset="0"/>
-                <a:cs typeface="Arial" panose="020B0604020202020204" pitchFamily="34" charset="0"/>
-              </a:rPr>
-              <a:t>PyQt5</a:t>
-            </a:r>
-            <a:r>
-              <a:rPr kumimoji="0" lang="en-US" altLang="en-US" sz="2000" b="0" i="0" u="none" strike="noStrike" cap="none" normalizeH="0" baseline="0" dirty="0">
-                <a:ln>
-                  <a:noFill/>
-                </a:ln>
-                <a:solidFill>
-                  <a:schemeClr val="tx1"/>
-                </a:solidFill>
-                <a:effectLst/>
-                <a:latin typeface="Arial" panose="020B0604020202020204" pitchFamily="34" charset="0"/>
-                <a:cs typeface="Arial" panose="020B0604020202020204" pitchFamily="34" charset="0"/>
-              </a:rPr>
-              <a:t> (Graphical User Interface)</a:t>
-            </a:r>
-          </a:p>
-          <a:p>
-            <a:pPr defTabSz="914400" eaLnBrk="0" fontAlgn="base" hangingPunct="0">
-              <a:lnSpc>
-                <a:spcPct val="150000"/>
-              </a:lnSpc>
-              <a:spcBef>
-                <a:spcPct val="0"/>
-              </a:spcBef>
-              <a:spcAft>
-                <a:spcPct val="0"/>
-              </a:spcAft>
-              <a:buClrTx/>
-              <a:buSzTx/>
-              <a:buFont typeface="Arial" panose="020B0604020202020204" pitchFamily="34" charset="0"/>
-              <a:buChar char="•"/>
-            </a:pPr>
-            <a:r>
-              <a:rPr kumimoji="0" lang="en-US" altLang="en-US" sz="2000" b="1" i="0" u="none" strike="noStrike" cap="none" normalizeH="0" baseline="0" dirty="0">
-                <a:ln>
-                  <a:noFill/>
-                </a:ln>
-                <a:solidFill>
-                  <a:schemeClr val="tx1"/>
-                </a:solidFill>
-                <a:effectLst/>
-                <a:latin typeface="Arial" panose="020B0604020202020204" pitchFamily="34" charset="0"/>
-                <a:cs typeface="Arial" panose="020B0604020202020204" pitchFamily="34" charset="0"/>
-              </a:rPr>
-              <a:t>Base64 &amp; </a:t>
-            </a:r>
-            <a:r>
-              <a:rPr kumimoji="0" lang="en-US" altLang="en-US" sz="2000" b="1" i="0" u="none" strike="noStrike" cap="none" normalizeH="0" baseline="0" dirty="0" err="1">
-                <a:ln>
-                  <a:noFill/>
-                </a:ln>
-                <a:solidFill>
-                  <a:schemeClr val="tx1"/>
-                </a:solidFill>
-                <a:effectLst/>
-                <a:latin typeface="Arial" panose="020B0604020202020204" pitchFamily="34" charset="0"/>
-                <a:cs typeface="Arial" panose="020B0604020202020204" pitchFamily="34" charset="0"/>
-              </a:rPr>
-              <a:t>Hashlib</a:t>
-            </a:r>
-            <a:r>
-              <a:rPr kumimoji="0" lang="en-US" altLang="en-US" sz="2000" b="0" i="0" u="none" strike="noStrike" cap="none" normalizeH="0" baseline="0" dirty="0">
-                <a:ln>
-                  <a:noFill/>
-                </a:ln>
-                <a:solidFill>
-                  <a:schemeClr val="tx1"/>
-                </a:solidFill>
-                <a:effectLst/>
-                <a:latin typeface="Arial" panose="020B0604020202020204" pitchFamily="34" charset="0"/>
-                <a:cs typeface="Arial" panose="020B0604020202020204" pitchFamily="34" charset="0"/>
-              </a:rPr>
-              <a:t> (Key Generation &amp; Encoding)</a:t>
-            </a:r>
-          </a:p>
-          <a:p>
-            <a:pPr defTabSz="914400" eaLnBrk="0" fontAlgn="base" hangingPunct="0">
-              <a:lnSpc>
-                <a:spcPct val="150000"/>
-              </a:lnSpc>
-              <a:spcBef>
-                <a:spcPct val="0"/>
-              </a:spcBef>
-              <a:spcAft>
-                <a:spcPct val="0"/>
-              </a:spcAft>
-              <a:buClrTx/>
-              <a:buSzTx/>
-              <a:buFont typeface="Arial" panose="020B0604020202020204" pitchFamily="34" charset="0"/>
-              <a:buChar char="•"/>
-            </a:pPr>
-            <a:r>
-              <a:rPr kumimoji="0" lang="en-US" altLang="en-US" sz="2000" b="1" i="0" u="none" strike="noStrike" cap="none" normalizeH="0" baseline="0" dirty="0">
-                <a:ln>
-                  <a:noFill/>
-                </a:ln>
-                <a:solidFill>
-                  <a:schemeClr val="tx1"/>
-                </a:solidFill>
-                <a:effectLst/>
-                <a:latin typeface="Arial" panose="020B0604020202020204" pitchFamily="34" charset="0"/>
-                <a:cs typeface="Arial" panose="020B0604020202020204" pitchFamily="34" charset="0"/>
-              </a:rPr>
               <a:t>Platforms</a:t>
             </a:r>
             <a:r>
-              <a:rPr kumimoji="0" lang="en-US" altLang="en-US" sz="2000" b="0" i="0" u="none" strike="noStrike" cap="none" normalizeH="0" baseline="0" dirty="0">
+              <a:rPr kumimoji="0" lang="en-US" altLang="en-US" sz="2400" b="0" i="0" u="none" strike="noStrike" cap="none" normalizeH="0" baseline="0" dirty="0">
                 <a:ln>
                   <a:noFill/>
                 </a:ln>
@@ -6541,7 +6541,7 @@
         </p:nvSpPr>
         <p:spPr bwMode="auto">
           <a:xfrm>
-            <a:off x="581192" y="2697693"/>
+            <a:off x="581192" y="2488005"/>
             <a:ext cx="10639323" cy="1881990"/>
           </a:xfrm>
           <a:prstGeom prst="rect">
@@ -7496,23 +7496,6 @@
 </file>
 
 <file path=customXml/item1.xml><?xml version="1.0" encoding="utf-8"?>
-<?mso-contentType ?>
-<FormTemplates xmlns="http://schemas.microsoft.com/sharepoint/v3/contenttype/forms">
-  <Display>DocumentLibraryForm</Display>
-  <Edit>DocumentLibraryForm</Edit>
-  <New>DocumentLibraryForm</New>
-</FormTemplates>
-</file>
-
-<file path=customXml/item2.xml><?xml version="1.0" encoding="utf-8"?>
-<p:properties xmlns:p="http://schemas.microsoft.com/office/2006/metadata/properties" xmlns:xsi="http://www.w3.org/2001/XMLSchema-instance" xmlns:pc="http://schemas.microsoft.com/office/infopath/2007/PartnerControls">
-  <documentManagement>
-    <_activity xmlns="b30265f8-c5e2-4918-b4a1-b977299ca3e2" xsi:nil="true"/>
-  </documentManagement>
-</p:properties>
-</file>
-
-<file path=customXml/item3.xml><?xml version="1.0" encoding="utf-8"?>
 <ct:contentTypeSchema xmlns:ct="http://schemas.microsoft.com/office/2006/metadata/contentType" xmlns:ma="http://schemas.microsoft.com/office/2006/metadata/properties/metaAttributes" ct:_="" ma:_="" ma:contentTypeName="Document" ma:contentTypeID="0x0101007F0268AC5E70984D8FE60B7154176407" ma:contentTypeVersion="15" ma:contentTypeDescription="Create a new document." ma:contentTypeScope="" ma:versionID="104e359103f0f57b1cf9676756e5b944">
   <xsd:schema xmlns:xsd="http://www.w3.org/2001/XMLSchema" xmlns:xs="http://www.w3.org/2001/XMLSchema" xmlns:p="http://schemas.microsoft.com/office/2006/metadata/properties" xmlns:ns3="b30265f8-c5e2-4918-b4a1-b977299ca3e2" xmlns:ns4="fadb41d3-f9cb-40fb-903c-8cacaba95bb5" targetNamespace="http://schemas.microsoft.com/office/2006/metadata/properties" ma:root="true" ma:fieldsID="5615b8f8aa772998bad551f24a33de0e" ns3:_="" ns4:_="">
     <xsd:import namespace="b30265f8-c5e2-4918-b4a1-b977299ca3e2"/>
@@ -7745,10 +7728,38 @@
 </ct:contentTypeSchema>
 </file>
 
+<file path=customXml/item2.xml><?xml version="1.0" encoding="utf-8"?>
+<p:properties xmlns:p="http://schemas.microsoft.com/office/2006/metadata/properties" xmlns:xsi="http://www.w3.org/2001/XMLSchema-instance" xmlns:pc="http://schemas.microsoft.com/office/infopath/2007/PartnerControls">
+  <documentManagement>
+    <_activity xmlns="b30265f8-c5e2-4918-b4a1-b977299ca3e2" xsi:nil="true"/>
+  </documentManagement>
+</p:properties>
+</file>
+
+<file path=customXml/item3.xml><?xml version="1.0" encoding="utf-8"?>
+<?mso-contentType ?>
+<FormTemplates xmlns="http://schemas.microsoft.com/sharepoint/v3/contenttype/forms">
+  <Display>DocumentLibraryForm</Display>
+  <Edit>DocumentLibraryForm</Edit>
+  <New>DocumentLibraryForm</New>
+</FormTemplates>
+</file>
+
 <file path=customXml/itemProps1.xml><?xml version="1.0" encoding="utf-8"?>
-<ds:datastoreItem xmlns:ds="http://schemas.openxmlformats.org/officeDocument/2006/customXml" ds:itemID="{927BD4C1-B6B1-4715-ABF9-E660A51A4EA0}">
+<ds:datastoreItem xmlns:ds="http://schemas.openxmlformats.org/officeDocument/2006/customXml" ds:itemID="{9DD71778-17EE-4151-88AE-C8F4E8043BD9}">
   <ds:schemaRefs>
-    <ds:schemaRef ds:uri="http://schemas.microsoft.com/sharepoint/v3/contenttype/forms"/>
+    <ds:schemaRef ds:uri="http://schemas.microsoft.com/office/2006/metadata/contentType"/>
+    <ds:schemaRef ds:uri="http://schemas.microsoft.com/office/2006/metadata/properties/metaAttributes"/>
+    <ds:schemaRef ds:uri="http://www.w3.org/2001/XMLSchema"/>
+    <ds:schemaRef ds:uri="http://schemas.microsoft.com/office/2006/metadata/properties"/>
+    <ds:schemaRef ds:uri="b30265f8-c5e2-4918-b4a1-b977299ca3e2"/>
+    <ds:schemaRef ds:uri="fadb41d3-f9cb-40fb-903c-8cacaba95bb5"/>
+    <ds:schemaRef ds:uri="http://schemas.microsoft.com/office/2006/documentManagement/types"/>
+    <ds:schemaRef ds:uri="http://schemas.microsoft.com/office/infopath/2007/PartnerControls"/>
+    <ds:schemaRef ds:uri="http://schemas.openxmlformats.org/package/2006/metadata/core-properties"/>
+    <ds:schemaRef ds:uri="http://purl.org/dc/elements/1.1/"/>
+    <ds:schemaRef ds:uri="http://purl.org/dc/terms/"/>
+    <ds:schemaRef ds:uri="http://schemas.microsoft.com/internal/obd"/>
   </ds:schemaRefs>
 </ds:datastoreItem>
 </file>
@@ -7771,20 +7782,9 @@
 </file>
 
 <file path=customXml/itemProps3.xml><?xml version="1.0" encoding="utf-8"?>
-<ds:datastoreItem xmlns:ds="http://schemas.openxmlformats.org/officeDocument/2006/customXml" ds:itemID="{9DD71778-17EE-4151-88AE-C8F4E8043BD9}">
+<ds:datastoreItem xmlns:ds="http://schemas.openxmlformats.org/officeDocument/2006/customXml" ds:itemID="{927BD4C1-B6B1-4715-ABF9-E660A51A4EA0}">
   <ds:schemaRefs>
-    <ds:schemaRef ds:uri="http://schemas.microsoft.com/office/2006/metadata/contentType"/>
-    <ds:schemaRef ds:uri="http://schemas.microsoft.com/office/2006/metadata/properties/metaAttributes"/>
-    <ds:schemaRef ds:uri="http://www.w3.org/2001/XMLSchema"/>
-    <ds:schemaRef ds:uri="http://schemas.microsoft.com/office/2006/metadata/properties"/>
-    <ds:schemaRef ds:uri="b30265f8-c5e2-4918-b4a1-b977299ca3e2"/>
-    <ds:schemaRef ds:uri="fadb41d3-f9cb-40fb-903c-8cacaba95bb5"/>
-    <ds:schemaRef ds:uri="http://schemas.microsoft.com/office/2006/documentManagement/types"/>
-    <ds:schemaRef ds:uri="http://schemas.microsoft.com/office/infopath/2007/PartnerControls"/>
-    <ds:schemaRef ds:uri="http://schemas.openxmlformats.org/package/2006/metadata/core-properties"/>
-    <ds:schemaRef ds:uri="http://purl.org/dc/elements/1.1/"/>
-    <ds:schemaRef ds:uri="http://purl.org/dc/terms/"/>
-    <ds:schemaRef ds:uri="http://schemas.microsoft.com/internal/obd"/>
+    <ds:schemaRef ds:uri="http://schemas.microsoft.com/sharepoint/v3/contenttype/forms"/>
   </ds:schemaRefs>
 </ds:datastoreItem>
 </file>
</xml_diff>